<commit_message>
modified git url in readMe
</commit_message>
<xml_diff>
--- a/data/tag/Tag-subscription-Presentation.pptx
+++ b/data/tag/Tag-subscription-Presentation.pptx
@@ -3941,18 +3941,19 @@
           </a:p>
           <a:p>
             <a:r>
-              <a:rPr lang="en-US" dirty="0">
+              <a:rPr lang="en-US">
                 <a:hlinkClick r:id="rId3"/>
               </a:rPr>
-              <a:t>https://github.com/ebhun851/tag-subscription/blob/master/README.adoc</a:t>
+              <a:t>https://github.com/ebhun00/item-tag-subscription/blob/master/README.adoc</a:t>
+            </a:r>
+            <a:endParaRPr lang="en-US"/>
+          </a:p>
+          <a:p>
+            <a:r>
+              <a:rPr lang="en-US"/>
+              <a:t> </a:t>
             </a:r>
             <a:endParaRPr lang="en-US" dirty="0"/>
-          </a:p>
-          <a:p>
-            <a:r>
-              <a:rPr lang="en-US" dirty="0"/>
-              <a:t> </a:t>
-            </a:r>
           </a:p>
         </p:txBody>
       </p:sp>

</xml_diff>